<commit_message>
save spot. Issue #146
</commit_message>
<xml_diff>
--- a/www/xci-app-legends.pptx
+++ b/www/xci-app-legends.pptx
@@ -104,6 +104,11 @@
       </a:defRPr>
     </a:lvl9pPr>
   </p:defaultTextStyle>
+  <p:extLst>
+    <p:ext uri="{EFAFB233-063F-42B5-8137-9DF3F51BA10A}">
+      <p15:sldGuideLst xmlns:p15="http://schemas.microsoft.com/office/powerpoint/2012/main"/>
+    </p:ext>
+  </p:extLst>
 </p:presentation>
 </file>
 
@@ -254,7 +259,7 @@
           <a:p>
             <a:fld id="{4408BF70-4071-5643-8CFC-42BA713BC812}" type="datetimeFigureOut">
               <a:rPr lang="en-US" smtClean="0"/>
-              <a:t>8/4/21</a:t>
+              <a:t>10/8/21</a:t>
             </a:fld>
             <a:endParaRPr lang="en-US"/>
           </a:p>
@@ -452,7 +457,7 @@
           <a:p>
             <a:fld id="{4408BF70-4071-5643-8CFC-42BA713BC812}" type="datetimeFigureOut">
               <a:rPr lang="en-US" smtClean="0"/>
-              <a:t>8/4/21</a:t>
+              <a:t>10/8/21</a:t>
             </a:fld>
             <a:endParaRPr lang="en-US"/>
           </a:p>
@@ -660,7 +665,7 @@
           <a:p>
             <a:fld id="{4408BF70-4071-5643-8CFC-42BA713BC812}" type="datetimeFigureOut">
               <a:rPr lang="en-US" smtClean="0"/>
-              <a:t>8/4/21</a:t>
+              <a:t>10/8/21</a:t>
             </a:fld>
             <a:endParaRPr lang="en-US"/>
           </a:p>
@@ -858,7 +863,7 @@
           <a:p>
             <a:fld id="{4408BF70-4071-5643-8CFC-42BA713BC812}" type="datetimeFigureOut">
               <a:rPr lang="en-US" smtClean="0"/>
-              <a:t>8/4/21</a:t>
+              <a:t>10/8/21</a:t>
             </a:fld>
             <a:endParaRPr lang="en-US"/>
           </a:p>
@@ -1133,7 +1138,7 @@
           <a:p>
             <a:fld id="{4408BF70-4071-5643-8CFC-42BA713BC812}" type="datetimeFigureOut">
               <a:rPr lang="en-US" smtClean="0"/>
-              <a:t>8/4/21</a:t>
+              <a:t>10/8/21</a:t>
             </a:fld>
             <a:endParaRPr lang="en-US"/>
           </a:p>
@@ -1398,7 +1403,7 @@
           <a:p>
             <a:fld id="{4408BF70-4071-5643-8CFC-42BA713BC812}" type="datetimeFigureOut">
               <a:rPr lang="en-US" smtClean="0"/>
-              <a:t>8/4/21</a:t>
+              <a:t>10/8/21</a:t>
             </a:fld>
             <a:endParaRPr lang="en-US"/>
           </a:p>
@@ -1810,7 +1815,7 @@
           <a:p>
             <a:fld id="{4408BF70-4071-5643-8CFC-42BA713BC812}" type="datetimeFigureOut">
               <a:rPr lang="en-US" smtClean="0"/>
-              <a:t>8/4/21</a:t>
+              <a:t>10/8/21</a:t>
             </a:fld>
             <a:endParaRPr lang="en-US"/>
           </a:p>
@@ -1951,7 +1956,7 @@
           <a:p>
             <a:fld id="{4408BF70-4071-5643-8CFC-42BA713BC812}" type="datetimeFigureOut">
               <a:rPr lang="en-US" smtClean="0"/>
-              <a:t>8/4/21</a:t>
+              <a:t>10/8/21</a:t>
             </a:fld>
             <a:endParaRPr lang="en-US"/>
           </a:p>
@@ -2064,7 +2069,7 @@
           <a:p>
             <a:fld id="{4408BF70-4071-5643-8CFC-42BA713BC812}" type="datetimeFigureOut">
               <a:rPr lang="en-US" smtClean="0"/>
-              <a:t>8/4/21</a:t>
+              <a:t>10/8/21</a:t>
             </a:fld>
             <a:endParaRPr lang="en-US"/>
           </a:p>
@@ -2375,7 +2380,7 @@
           <a:p>
             <a:fld id="{4408BF70-4071-5643-8CFC-42BA713BC812}" type="datetimeFigureOut">
               <a:rPr lang="en-US" smtClean="0"/>
-              <a:t>8/4/21</a:t>
+              <a:t>10/8/21</a:t>
             </a:fld>
             <a:endParaRPr lang="en-US"/>
           </a:p>
@@ -2663,7 +2668,7 @@
           <a:p>
             <a:fld id="{4408BF70-4071-5643-8CFC-42BA713BC812}" type="datetimeFigureOut">
               <a:rPr lang="en-US" smtClean="0"/>
-              <a:t>8/4/21</a:t>
+              <a:t>10/8/21</a:t>
             </a:fld>
             <a:endParaRPr lang="en-US"/>
           </a:p>
@@ -2904,7 +2909,7 @@
           <a:p>
             <a:fld id="{4408BF70-4071-5643-8CFC-42BA713BC812}" type="datetimeFigureOut">
               <a:rPr lang="en-US" smtClean="0"/>
-              <a:t>8/4/21</a:t>
+              <a:t>10/8/21</a:t>
             </a:fld>
             <a:endParaRPr lang="en-US"/>
           </a:p>
@@ -3764,6 +3769,91 @@
           </a:p>
         </p:txBody>
       </p:sp>
+      <p:pic>
+        <p:nvPicPr>
+          <p:cNvPr id="15" name="Picture 14">
+            <a:extLst>
+              <a:ext uri="{FF2B5EF4-FFF2-40B4-BE49-F238E27FC236}">
+                <a16:creationId xmlns:a16="http://schemas.microsoft.com/office/drawing/2014/main" id="{6D36857B-2CFD-EC4A-83C8-D0FC5CC0202C}"/>
+              </a:ext>
+            </a:extLst>
+          </p:cNvPr>
+          <p:cNvPicPr>
+            <a:picLocks noChangeAspect="1"/>
+          </p:cNvPicPr>
+          <p:nvPr/>
+        </p:nvPicPr>
+        <p:blipFill>
+          <a:blip r:embed="rId2"/>
+          <a:stretch>
+            <a:fillRect/>
+          </a:stretch>
+        </p:blipFill>
+        <p:spPr>
+          <a:xfrm>
+            <a:off x="871538" y="1575336"/>
+            <a:ext cx="4305300" cy="355600"/>
+          </a:xfrm>
+          <a:prstGeom prst="rect">
+            <a:avLst/>
+          </a:prstGeom>
+        </p:spPr>
+      </p:pic>
+      <p:sp>
+        <p:nvSpPr>
+          <p:cNvPr id="16" name="Rectangle 15">
+            <a:extLst>
+              <a:ext uri="{FF2B5EF4-FFF2-40B4-BE49-F238E27FC236}">
+                <a16:creationId xmlns:a16="http://schemas.microsoft.com/office/drawing/2014/main" id="{B1917397-4856-F34C-8F8E-BE4787372BC7}"/>
+              </a:ext>
+            </a:extLst>
+          </p:cNvPr>
+          <p:cNvSpPr/>
+          <p:nvPr/>
+        </p:nvSpPr>
+        <p:spPr>
+          <a:xfrm>
+            <a:off x="3972041" y="1634581"/>
+            <a:ext cx="213360" cy="213360"/>
+          </a:xfrm>
+          <a:prstGeom prst="rect">
+            <a:avLst/>
+          </a:prstGeom>
+          <a:solidFill>
+            <a:schemeClr val="tx1">
+              <a:lumMod val="75000"/>
+              <a:lumOff val="25000"/>
+            </a:schemeClr>
+          </a:solidFill>
+          <a:ln>
+            <a:noFill/>
+          </a:ln>
+        </p:spPr>
+        <p:style>
+          <a:lnRef idx="2">
+            <a:schemeClr val="accent1">
+              <a:shade val="50000"/>
+            </a:schemeClr>
+          </a:lnRef>
+          <a:fillRef idx="1">
+            <a:schemeClr val="accent1"/>
+          </a:fillRef>
+          <a:effectRef idx="0">
+            <a:schemeClr val="accent1"/>
+          </a:effectRef>
+          <a:fontRef idx="minor">
+            <a:schemeClr val="lt1"/>
+          </a:fontRef>
+        </p:style>
+        <p:txBody>
+          <a:bodyPr rtlCol="0" anchor="ctr"/>
+          <a:lstStyle/>
+          <a:p>
+            <a:pPr algn="ctr"/>
+            <a:endParaRPr lang="en-US"/>
+          </a:p>
+        </p:txBody>
+      </p:sp>
     </p:spTree>
     <p:extLst>
       <p:ext uri="{BB962C8B-B14F-4D97-AF65-F5344CB8AC3E}">

</xml_diff>